<commit_message>
Edited sequence diagram for meet command
</commit_message>
<xml_diff>
--- a/docs/diagrams/MeetSequenceDiagram.pptx
+++ b/docs/diagrams/MeetSequenceDiagram.pptx
@@ -1668,7 +1668,7 @@
                 </a:solidFill>
                 <a:latin typeface="Calibri"/>
               </a:rPr>
-              <a:t>14/4/2019</a:t>
+              <a:t>15/4/2019</a:t>
             </a:fld>
             <a:endParaRPr lang="en-SG" sz="1200" b="0" strike="noStrike" spc="-1">
               <a:latin typeface="Times New Roman"/>
@@ -3866,7 +3866,7 @@
         <p:spPr>
           <a:xfrm>
             <a:off x="5290306" y="1497140"/>
-            <a:ext cx="1749240" cy="553320"/>
+            <a:ext cx="1722503" cy="553320"/>
           </a:xfrm>
           <a:prstGeom prst="rect">
             <a:avLst/>
@@ -4662,7 +4662,7 @@
         <p:spPr>
           <a:xfrm>
             <a:off x="7725745" y="3169142"/>
-            <a:ext cx="4680" cy="717954"/>
+            <a:ext cx="0" cy="10729378"/>
           </a:xfrm>
           <a:prstGeom prst="line">
             <a:avLst/>
@@ -7494,6 +7494,61 @@
               <a:t>commit()</a:t>
             </a:r>
             <a:endParaRPr lang="en-SG" sz="1200" b="0" strike="noStrike" spc="-1" dirty="0">
+              <a:latin typeface="Arial"/>
+            </a:endParaRPr>
+          </a:p>
+        </p:txBody>
+      </p:sp>
+      <p:sp>
+        <p:nvSpPr>
+          <p:cNvPr id="143" name="CustomShape 30"/>
+          <p:cNvSpPr/>
+          <p:nvPr/>
+        </p:nvSpPr>
+        <p:spPr>
+          <a:xfrm>
+            <a:off x="7601652" y="13865081"/>
+            <a:ext cx="277200" cy="257760"/>
+          </a:xfrm>
+          <a:prstGeom prst="rect">
+            <a:avLst/>
+          </a:prstGeom>
+          <a:noFill/>
+          <a:ln>
+            <a:noFill/>
+          </a:ln>
+        </p:spPr>
+        <p:style>
+          <a:lnRef idx="0">
+            <a:scrgbClr r="0" g="0" b="0"/>
+          </a:lnRef>
+          <a:fillRef idx="0">
+            <a:scrgbClr r="0" g="0" b="0"/>
+          </a:fillRef>
+          <a:effectRef idx="0">
+            <a:scrgbClr r="0" g="0" b="0"/>
+          </a:effectRef>
+          <a:fontRef idx="minor"/>
+        </p:style>
+        <p:txBody>
+          <a:bodyPr wrap="none" lIns="90000" tIns="45000" rIns="90000" bIns="45000"/>
+          <a:lstStyle/>
+          <a:p>
+            <a:pPr>
+              <a:lnSpc>
+                <a:spcPct val="100000"/>
+              </a:lnSpc>
+            </a:pPr>
+            <a:r>
+              <a:rPr lang="en-SG" sz="1100" b="0" strike="noStrike" spc="-1" dirty="0">
+                <a:solidFill>
+                  <a:srgbClr val="002060"/>
+                </a:solidFill>
+                <a:latin typeface="Calibri"/>
+              </a:rPr>
+              <a:t>X</a:t>
+            </a:r>
+            <a:endParaRPr lang="en-SG" sz="1100" b="0" strike="noStrike" spc="-1" dirty="0">
               <a:latin typeface="Arial"/>
             </a:endParaRPr>
           </a:p>

</xml_diff>